<commit_message>
use BL mesh on far boundary
</commit_message>
<xml_diff>
--- a/meshdivision.pptx
+++ b/meshdivision.pptx
@@ -8,6 +8,7 @@
     <p:sldId id="256" r:id="rId2"/>
     <p:sldId id="257" r:id="rId3"/>
     <p:sldId id="258" r:id="rId4"/>
+    <p:sldId id="259" r:id="rId5"/>
   </p:sldIdLst>
   <p:sldSz cx="12192000" cy="6858000"/>
   <p:notesSz cx="6858000" cy="9144000"/>
@@ -256,7 +257,7 @@
           <a:p>
             <a:fld id="{750CC82B-8B7E-47A1-8494-B87BF6FD552D}" type="datetimeFigureOut">
               <a:rPr lang="zh-CN" altLang="en-US" smtClean="0"/>
-              <a:t>2020/10/7</a:t>
+              <a:t>2020/10/16</a:t>
             </a:fld>
             <a:endParaRPr lang="zh-CN" altLang="en-US"/>
           </a:p>
@@ -426,7 +427,7 @@
           <a:p>
             <a:fld id="{750CC82B-8B7E-47A1-8494-B87BF6FD552D}" type="datetimeFigureOut">
               <a:rPr lang="zh-CN" altLang="en-US" smtClean="0"/>
-              <a:t>2020/10/7</a:t>
+              <a:t>2020/10/16</a:t>
             </a:fld>
             <a:endParaRPr lang="zh-CN" altLang="en-US"/>
           </a:p>
@@ -606,7 +607,7 @@
           <a:p>
             <a:fld id="{750CC82B-8B7E-47A1-8494-B87BF6FD552D}" type="datetimeFigureOut">
               <a:rPr lang="zh-CN" altLang="en-US" smtClean="0"/>
-              <a:t>2020/10/7</a:t>
+              <a:t>2020/10/16</a:t>
             </a:fld>
             <a:endParaRPr lang="zh-CN" altLang="en-US"/>
           </a:p>
@@ -776,7 +777,7 @@
           <a:p>
             <a:fld id="{750CC82B-8B7E-47A1-8494-B87BF6FD552D}" type="datetimeFigureOut">
               <a:rPr lang="zh-CN" altLang="en-US" smtClean="0"/>
-              <a:t>2020/10/7</a:t>
+              <a:t>2020/10/16</a:t>
             </a:fld>
             <a:endParaRPr lang="zh-CN" altLang="en-US"/>
           </a:p>
@@ -1022,7 +1023,7 @@
           <a:p>
             <a:fld id="{750CC82B-8B7E-47A1-8494-B87BF6FD552D}" type="datetimeFigureOut">
               <a:rPr lang="zh-CN" altLang="en-US" smtClean="0"/>
-              <a:t>2020/10/7</a:t>
+              <a:t>2020/10/16</a:t>
             </a:fld>
             <a:endParaRPr lang="zh-CN" altLang="en-US"/>
           </a:p>
@@ -1254,7 +1255,7 @@
           <a:p>
             <a:fld id="{750CC82B-8B7E-47A1-8494-B87BF6FD552D}" type="datetimeFigureOut">
               <a:rPr lang="zh-CN" altLang="en-US" smtClean="0"/>
-              <a:t>2020/10/7</a:t>
+              <a:t>2020/10/16</a:t>
             </a:fld>
             <a:endParaRPr lang="zh-CN" altLang="en-US"/>
           </a:p>
@@ -1621,7 +1622,7 @@
           <a:p>
             <a:fld id="{750CC82B-8B7E-47A1-8494-B87BF6FD552D}" type="datetimeFigureOut">
               <a:rPr lang="zh-CN" altLang="en-US" smtClean="0"/>
-              <a:t>2020/10/7</a:t>
+              <a:t>2020/10/16</a:t>
             </a:fld>
             <a:endParaRPr lang="zh-CN" altLang="en-US"/>
           </a:p>
@@ -1739,7 +1740,7 @@
           <a:p>
             <a:fld id="{750CC82B-8B7E-47A1-8494-B87BF6FD552D}" type="datetimeFigureOut">
               <a:rPr lang="zh-CN" altLang="en-US" smtClean="0"/>
-              <a:t>2020/10/7</a:t>
+              <a:t>2020/10/16</a:t>
             </a:fld>
             <a:endParaRPr lang="zh-CN" altLang="en-US"/>
           </a:p>
@@ -1834,7 +1835,7 @@
           <a:p>
             <a:fld id="{750CC82B-8B7E-47A1-8494-B87BF6FD552D}" type="datetimeFigureOut">
               <a:rPr lang="zh-CN" altLang="en-US" smtClean="0"/>
-              <a:t>2020/10/7</a:t>
+              <a:t>2020/10/16</a:t>
             </a:fld>
             <a:endParaRPr lang="zh-CN" altLang="en-US"/>
           </a:p>
@@ -2111,7 +2112,7 @@
           <a:p>
             <a:fld id="{750CC82B-8B7E-47A1-8494-B87BF6FD552D}" type="datetimeFigureOut">
               <a:rPr lang="zh-CN" altLang="en-US" smtClean="0"/>
-              <a:t>2020/10/7</a:t>
+              <a:t>2020/10/16</a:t>
             </a:fld>
             <a:endParaRPr lang="zh-CN" altLang="en-US"/>
           </a:p>
@@ -2364,7 +2365,7 @@
           <a:p>
             <a:fld id="{750CC82B-8B7E-47A1-8494-B87BF6FD552D}" type="datetimeFigureOut">
               <a:rPr lang="zh-CN" altLang="en-US" smtClean="0"/>
-              <a:t>2020/10/7</a:t>
+              <a:t>2020/10/16</a:t>
             </a:fld>
             <a:endParaRPr lang="zh-CN" altLang="en-US"/>
           </a:p>
@@ -2577,7 +2578,7 @@
           <a:p>
             <a:fld id="{750CC82B-8B7E-47A1-8494-B87BF6FD552D}" type="datetimeFigureOut">
               <a:rPr lang="zh-CN" altLang="en-US" smtClean="0"/>
-              <a:t>2020/10/7</a:t>
+              <a:t>2020/10/16</a:t>
             </a:fld>
             <a:endParaRPr lang="zh-CN" altLang="en-US"/>
           </a:p>
@@ -7757,6 +7758,904 @@
 </p:sld>
 </file>
 
+<file path=ppt/slides/slide4.xml><?xml version="1.0" encoding="utf-8"?>
+<p:sld xmlns:a="http://schemas.openxmlformats.org/drawingml/2006/main" xmlns:r="http://schemas.openxmlformats.org/officeDocument/2006/relationships" xmlns:p="http://schemas.openxmlformats.org/presentationml/2006/main">
+  <p:cSld>
+    <p:spTree>
+      <p:nvGrpSpPr>
+        <p:cNvPr id="1" name=""/>
+        <p:cNvGrpSpPr/>
+        <p:nvPr/>
+      </p:nvGrpSpPr>
+      <p:grpSpPr>
+        <a:xfrm>
+          <a:off x="0" y="0"/>
+          <a:ext cx="0" cy="0"/>
+          <a:chOff x="0" y="0"/>
+          <a:chExt cx="0" cy="0"/>
+        </a:xfrm>
+      </p:grpSpPr>
+      <p:cxnSp>
+        <p:nvCxnSpPr>
+          <p:cNvPr id="43" name="Straight Connector 42">
+            <a:extLst>
+              <a:ext uri="{FF2B5EF4-FFF2-40B4-BE49-F238E27FC236}">
+                <a16:creationId xmlns:a16="http://schemas.microsoft.com/office/drawing/2014/main" id="{D162D1AE-3C31-D345-AA18-FF8086278678}"/>
+              </a:ext>
+            </a:extLst>
+          </p:cNvPr>
+          <p:cNvCxnSpPr/>
+          <p:nvPr/>
+        </p:nvCxnSpPr>
+        <p:spPr>
+          <a:xfrm>
+            <a:off x="736847" y="798990"/>
+            <a:ext cx="0" cy="5255581"/>
+          </a:xfrm>
+          <a:prstGeom prst="line">
+            <a:avLst/>
+          </a:prstGeom>
+        </p:spPr>
+        <p:style>
+          <a:lnRef idx="1">
+            <a:schemeClr val="accent1"/>
+          </a:lnRef>
+          <a:fillRef idx="0">
+            <a:schemeClr val="accent1"/>
+          </a:fillRef>
+          <a:effectRef idx="0">
+            <a:schemeClr val="accent1"/>
+          </a:effectRef>
+          <a:fontRef idx="minor">
+            <a:schemeClr val="tx1"/>
+          </a:fontRef>
+        </p:style>
+      </p:cxnSp>
+      <p:cxnSp>
+        <p:nvCxnSpPr>
+          <p:cNvPr id="45" name="Straight Connector 44">
+            <a:extLst>
+              <a:ext uri="{FF2B5EF4-FFF2-40B4-BE49-F238E27FC236}">
+                <a16:creationId xmlns:a16="http://schemas.microsoft.com/office/drawing/2014/main" id="{0B689E7C-EB13-AC46-AD95-7B960BD80E3F}"/>
+              </a:ext>
+            </a:extLst>
+          </p:cNvPr>
+          <p:cNvCxnSpPr/>
+          <p:nvPr/>
+        </p:nvCxnSpPr>
+        <p:spPr>
+          <a:xfrm>
+            <a:off x="745724" y="6054571"/>
+            <a:ext cx="10804125" cy="0"/>
+          </a:xfrm>
+          <a:prstGeom prst="line">
+            <a:avLst/>
+          </a:prstGeom>
+        </p:spPr>
+        <p:style>
+          <a:lnRef idx="1">
+            <a:schemeClr val="accent1"/>
+          </a:lnRef>
+          <a:fillRef idx="0">
+            <a:schemeClr val="accent1"/>
+          </a:fillRef>
+          <a:effectRef idx="0">
+            <a:schemeClr val="accent1"/>
+          </a:effectRef>
+          <a:fontRef idx="minor">
+            <a:schemeClr val="tx1"/>
+          </a:fontRef>
+        </p:style>
+      </p:cxnSp>
+      <p:cxnSp>
+        <p:nvCxnSpPr>
+          <p:cNvPr id="47" name="Straight Connector 46">
+            <a:extLst>
+              <a:ext uri="{FF2B5EF4-FFF2-40B4-BE49-F238E27FC236}">
+                <a16:creationId xmlns:a16="http://schemas.microsoft.com/office/drawing/2014/main" id="{422906EC-DE9D-DC41-8CFF-A4A2E87B7E08}"/>
+              </a:ext>
+            </a:extLst>
+          </p:cNvPr>
+          <p:cNvCxnSpPr/>
+          <p:nvPr/>
+        </p:nvCxnSpPr>
+        <p:spPr>
+          <a:xfrm>
+            <a:off x="736847" y="798990"/>
+            <a:ext cx="11008310" cy="0"/>
+          </a:xfrm>
+          <a:prstGeom prst="line">
+            <a:avLst/>
+          </a:prstGeom>
+        </p:spPr>
+        <p:style>
+          <a:lnRef idx="1">
+            <a:schemeClr val="accent1"/>
+          </a:lnRef>
+          <a:fillRef idx="0">
+            <a:schemeClr val="accent1"/>
+          </a:fillRef>
+          <a:effectRef idx="0">
+            <a:schemeClr val="accent1"/>
+          </a:effectRef>
+          <a:fontRef idx="minor">
+            <a:schemeClr val="tx1"/>
+          </a:fontRef>
+        </p:style>
+      </p:cxnSp>
+      <p:cxnSp>
+        <p:nvCxnSpPr>
+          <p:cNvPr id="49" name="Straight Connector 48">
+            <a:extLst>
+              <a:ext uri="{FF2B5EF4-FFF2-40B4-BE49-F238E27FC236}">
+                <a16:creationId xmlns:a16="http://schemas.microsoft.com/office/drawing/2014/main" id="{D6B6BEF5-AAAF-1143-B5A8-3C03219282E6}"/>
+              </a:ext>
+            </a:extLst>
+          </p:cNvPr>
+          <p:cNvCxnSpPr>
+            <a:cxnSpLocks/>
+          </p:cNvCxnSpPr>
+          <p:nvPr/>
+        </p:nvCxnSpPr>
+        <p:spPr>
+          <a:xfrm flipV="1">
+            <a:off x="11549849" y="798990"/>
+            <a:ext cx="195308" cy="5255581"/>
+          </a:xfrm>
+          <a:prstGeom prst="line">
+            <a:avLst/>
+          </a:prstGeom>
+        </p:spPr>
+        <p:style>
+          <a:lnRef idx="1">
+            <a:schemeClr val="accent1"/>
+          </a:lnRef>
+          <a:fillRef idx="0">
+            <a:schemeClr val="accent1"/>
+          </a:fillRef>
+          <a:effectRef idx="0">
+            <a:schemeClr val="accent1"/>
+          </a:effectRef>
+          <a:fontRef idx="minor">
+            <a:schemeClr val="tx1"/>
+          </a:fontRef>
+        </p:style>
+      </p:cxnSp>
+      <p:sp>
+        <p:nvSpPr>
+          <p:cNvPr id="59" name="TextBox 58">
+            <a:extLst>
+              <a:ext uri="{FF2B5EF4-FFF2-40B4-BE49-F238E27FC236}">
+                <a16:creationId xmlns:a16="http://schemas.microsoft.com/office/drawing/2014/main" id="{A3CEA8DD-20D4-A347-B56A-434A8702A721}"/>
+              </a:ext>
+            </a:extLst>
+          </p:cNvPr>
+          <p:cNvSpPr txBox="1"/>
+          <p:nvPr/>
+        </p:nvSpPr>
+        <p:spPr>
+          <a:xfrm>
+            <a:off x="497780" y="6047459"/>
+            <a:ext cx="428322" cy="369332"/>
+          </a:xfrm>
+          <a:prstGeom prst="rect">
+            <a:avLst/>
+          </a:prstGeom>
+          <a:noFill/>
+        </p:spPr>
+        <p:txBody>
+          <a:bodyPr wrap="none" rtlCol="0">
+            <a:spAutoFit/>
+          </a:bodyPr>
+          <a:lstStyle/>
+          <a:p>
+            <a:r>
+              <a:rPr lang="en-US" dirty="0"/>
+              <a:t>11</a:t>
+            </a:r>
+          </a:p>
+        </p:txBody>
+      </p:sp>
+      <p:sp>
+        <p:nvSpPr>
+          <p:cNvPr id="60" name="TextBox 59">
+            <a:extLst>
+              <a:ext uri="{FF2B5EF4-FFF2-40B4-BE49-F238E27FC236}">
+                <a16:creationId xmlns:a16="http://schemas.microsoft.com/office/drawing/2014/main" id="{B5EA8F03-27EC-1042-8502-2D2617F47D87}"/>
+              </a:ext>
+            </a:extLst>
+          </p:cNvPr>
+          <p:cNvSpPr txBox="1"/>
+          <p:nvPr/>
+        </p:nvSpPr>
+        <p:spPr>
+          <a:xfrm>
+            <a:off x="745724" y="798990"/>
+            <a:ext cx="428322" cy="369332"/>
+          </a:xfrm>
+          <a:prstGeom prst="rect">
+            <a:avLst/>
+          </a:prstGeom>
+          <a:noFill/>
+        </p:spPr>
+        <p:txBody>
+          <a:bodyPr wrap="none" rtlCol="0">
+            <a:spAutoFit/>
+          </a:bodyPr>
+          <a:lstStyle/>
+          <a:p>
+            <a:r>
+              <a:rPr lang="en-US" dirty="0"/>
+              <a:t>10</a:t>
+            </a:r>
+          </a:p>
+        </p:txBody>
+      </p:sp>
+      <p:sp>
+        <p:nvSpPr>
+          <p:cNvPr id="61" name="TextBox 60">
+            <a:extLst>
+              <a:ext uri="{FF2B5EF4-FFF2-40B4-BE49-F238E27FC236}">
+                <a16:creationId xmlns:a16="http://schemas.microsoft.com/office/drawing/2014/main" id="{BDCEF14A-26CD-D740-9F16-764CF9AC73EE}"/>
+              </a:ext>
+            </a:extLst>
+          </p:cNvPr>
+          <p:cNvSpPr txBox="1"/>
+          <p:nvPr/>
+        </p:nvSpPr>
+        <p:spPr>
+          <a:xfrm>
+            <a:off x="11234479" y="5685239"/>
+            <a:ext cx="306494" cy="369332"/>
+          </a:xfrm>
+          <a:prstGeom prst="rect">
+            <a:avLst/>
+          </a:prstGeom>
+          <a:noFill/>
+        </p:spPr>
+        <p:txBody>
+          <a:bodyPr wrap="none" rtlCol="0">
+            <a:spAutoFit/>
+          </a:bodyPr>
+          <a:lstStyle/>
+          <a:p>
+            <a:r>
+              <a:rPr lang="en-US" dirty="0"/>
+              <a:t>8</a:t>
+            </a:r>
+          </a:p>
+        </p:txBody>
+      </p:sp>
+      <p:sp>
+        <p:nvSpPr>
+          <p:cNvPr id="62" name="TextBox 61">
+            <a:extLst>
+              <a:ext uri="{FF2B5EF4-FFF2-40B4-BE49-F238E27FC236}">
+                <a16:creationId xmlns:a16="http://schemas.microsoft.com/office/drawing/2014/main" id="{66792959-F990-5B47-A4D5-80E92150E47A}"/>
+              </a:ext>
+            </a:extLst>
+          </p:cNvPr>
+          <p:cNvSpPr txBox="1"/>
+          <p:nvPr/>
+        </p:nvSpPr>
+        <p:spPr>
+          <a:xfrm>
+            <a:off x="11647503" y="497721"/>
+            <a:ext cx="306494" cy="369332"/>
+          </a:xfrm>
+          <a:prstGeom prst="rect">
+            <a:avLst/>
+          </a:prstGeom>
+          <a:noFill/>
+        </p:spPr>
+        <p:txBody>
+          <a:bodyPr wrap="none" rtlCol="0">
+            <a:spAutoFit/>
+          </a:bodyPr>
+          <a:lstStyle/>
+          <a:p>
+            <a:r>
+              <a:rPr lang="en-US" dirty="0"/>
+              <a:t>9</a:t>
+            </a:r>
+          </a:p>
+        </p:txBody>
+      </p:sp>
+      <p:sp>
+        <p:nvSpPr>
+          <p:cNvPr id="72" name="TextBox 71">
+            <a:extLst>
+              <a:ext uri="{FF2B5EF4-FFF2-40B4-BE49-F238E27FC236}">
+                <a16:creationId xmlns:a16="http://schemas.microsoft.com/office/drawing/2014/main" id="{4E7222C8-73DE-934D-90A3-B796AFBC232D}"/>
+              </a:ext>
+            </a:extLst>
+          </p:cNvPr>
+          <p:cNvSpPr txBox="1"/>
+          <p:nvPr/>
+        </p:nvSpPr>
+        <p:spPr>
+          <a:xfrm>
+            <a:off x="366252" y="3319509"/>
+            <a:ext cx="428322" cy="369332"/>
+          </a:xfrm>
+          <a:prstGeom prst="rect">
+            <a:avLst/>
+          </a:prstGeom>
+          <a:noFill/>
+        </p:spPr>
+        <p:txBody>
+          <a:bodyPr wrap="none" rtlCol="0">
+            <a:spAutoFit/>
+          </a:bodyPr>
+          <a:lstStyle/>
+          <a:p>
+            <a:r>
+              <a:rPr lang="en-US" dirty="0">
+                <a:solidFill>
+                  <a:srgbClr val="FF0000"/>
+                </a:solidFill>
+              </a:rPr>
+              <a:t>11</a:t>
+            </a:r>
+          </a:p>
+        </p:txBody>
+      </p:sp>
+      <p:sp>
+        <p:nvSpPr>
+          <p:cNvPr id="73" name="TextBox 72">
+            <a:extLst>
+              <a:ext uri="{FF2B5EF4-FFF2-40B4-BE49-F238E27FC236}">
+                <a16:creationId xmlns:a16="http://schemas.microsoft.com/office/drawing/2014/main" id="{61D0DC6A-19C6-5041-A41D-89185ED49788}"/>
+              </a:ext>
+            </a:extLst>
+          </p:cNvPr>
+          <p:cNvSpPr txBox="1"/>
+          <p:nvPr/>
+        </p:nvSpPr>
+        <p:spPr>
+          <a:xfrm>
+            <a:off x="5107830" y="6039891"/>
+            <a:ext cx="428322" cy="369332"/>
+          </a:xfrm>
+          <a:prstGeom prst="rect">
+            <a:avLst/>
+          </a:prstGeom>
+          <a:noFill/>
+        </p:spPr>
+        <p:txBody>
+          <a:bodyPr wrap="none" rtlCol="0">
+            <a:spAutoFit/>
+          </a:bodyPr>
+          <a:lstStyle/>
+          <a:p>
+            <a:r>
+              <a:rPr lang="en-US" dirty="0">
+                <a:solidFill>
+                  <a:srgbClr val="FF0000"/>
+                </a:solidFill>
+              </a:rPr>
+              <a:t>12</a:t>
+            </a:r>
+          </a:p>
+        </p:txBody>
+      </p:sp>
+      <p:sp>
+        <p:nvSpPr>
+          <p:cNvPr id="74" name="TextBox 73">
+            <a:extLst>
+              <a:ext uri="{FF2B5EF4-FFF2-40B4-BE49-F238E27FC236}">
+                <a16:creationId xmlns:a16="http://schemas.microsoft.com/office/drawing/2014/main" id="{90CC4F78-8B04-2745-A6AD-0BC1D0037C96}"/>
+              </a:ext>
+            </a:extLst>
+          </p:cNvPr>
+          <p:cNvSpPr txBox="1"/>
+          <p:nvPr/>
+        </p:nvSpPr>
+        <p:spPr>
+          <a:xfrm>
+            <a:off x="5890120" y="521453"/>
+            <a:ext cx="428322" cy="369332"/>
+          </a:xfrm>
+          <a:prstGeom prst="rect">
+            <a:avLst/>
+          </a:prstGeom>
+          <a:noFill/>
+        </p:spPr>
+        <p:txBody>
+          <a:bodyPr wrap="none" rtlCol="0">
+            <a:spAutoFit/>
+          </a:bodyPr>
+          <a:lstStyle/>
+          <a:p>
+            <a:r>
+              <a:rPr lang="en-US" dirty="0">
+                <a:solidFill>
+                  <a:srgbClr val="FF0000"/>
+                </a:solidFill>
+              </a:rPr>
+              <a:t>10</a:t>
+            </a:r>
+          </a:p>
+        </p:txBody>
+      </p:sp>
+      <p:sp>
+        <p:nvSpPr>
+          <p:cNvPr id="75" name="TextBox 74">
+            <a:extLst>
+              <a:ext uri="{FF2B5EF4-FFF2-40B4-BE49-F238E27FC236}">
+                <a16:creationId xmlns:a16="http://schemas.microsoft.com/office/drawing/2014/main" id="{9EBF9407-DBE2-394B-8287-A5C733031736}"/>
+              </a:ext>
+            </a:extLst>
+          </p:cNvPr>
+          <p:cNvSpPr txBox="1"/>
+          <p:nvPr/>
+        </p:nvSpPr>
+        <p:spPr>
+          <a:xfrm>
+            <a:off x="11358976" y="3242055"/>
+            <a:ext cx="306494" cy="369332"/>
+          </a:xfrm>
+          <a:prstGeom prst="rect">
+            <a:avLst/>
+          </a:prstGeom>
+          <a:noFill/>
+        </p:spPr>
+        <p:txBody>
+          <a:bodyPr wrap="none" rtlCol="0">
+            <a:spAutoFit/>
+          </a:bodyPr>
+          <a:lstStyle/>
+          <a:p>
+            <a:r>
+              <a:rPr lang="en-US" dirty="0">
+                <a:solidFill>
+                  <a:srgbClr val="FF0000"/>
+                </a:solidFill>
+              </a:rPr>
+              <a:t>9</a:t>
+            </a:r>
+          </a:p>
+        </p:txBody>
+      </p:sp>
+      <p:cxnSp>
+        <p:nvCxnSpPr>
+          <p:cNvPr id="4" name="Straight Connector 3">
+            <a:extLst>
+              <a:ext uri="{FF2B5EF4-FFF2-40B4-BE49-F238E27FC236}">
+                <a16:creationId xmlns:a16="http://schemas.microsoft.com/office/drawing/2014/main" id="{8064ED72-4CC0-C343-8753-E9AEF892EE3C}"/>
+              </a:ext>
+            </a:extLst>
+          </p:cNvPr>
+          <p:cNvCxnSpPr/>
+          <p:nvPr/>
+        </p:nvCxnSpPr>
+        <p:spPr>
+          <a:xfrm>
+            <a:off x="1712259" y="798990"/>
+            <a:ext cx="0" cy="5255581"/>
+          </a:xfrm>
+          <a:prstGeom prst="line">
+            <a:avLst/>
+          </a:prstGeom>
+        </p:spPr>
+        <p:style>
+          <a:lnRef idx="1">
+            <a:schemeClr val="accent1"/>
+          </a:lnRef>
+          <a:fillRef idx="0">
+            <a:schemeClr val="accent1"/>
+          </a:fillRef>
+          <a:effectRef idx="0">
+            <a:schemeClr val="accent1"/>
+          </a:effectRef>
+          <a:fontRef idx="minor">
+            <a:schemeClr val="tx1"/>
+          </a:fontRef>
+        </p:style>
+      </p:cxnSp>
+      <p:cxnSp>
+        <p:nvCxnSpPr>
+          <p:cNvPr id="8" name="Straight Connector 7">
+            <a:extLst>
+              <a:ext uri="{FF2B5EF4-FFF2-40B4-BE49-F238E27FC236}">
+                <a16:creationId xmlns:a16="http://schemas.microsoft.com/office/drawing/2014/main" id="{94DD1D25-CFFF-1B48-841B-CF429401838B}"/>
+              </a:ext>
+            </a:extLst>
+          </p:cNvPr>
+          <p:cNvCxnSpPr/>
+          <p:nvPr/>
+        </p:nvCxnSpPr>
+        <p:spPr>
+          <a:xfrm flipH="1">
+            <a:off x="10434918" y="798990"/>
+            <a:ext cx="179294" cy="5255581"/>
+          </a:xfrm>
+          <a:prstGeom prst="line">
+            <a:avLst/>
+          </a:prstGeom>
+        </p:spPr>
+        <p:style>
+          <a:lnRef idx="1">
+            <a:schemeClr val="accent1"/>
+          </a:lnRef>
+          <a:fillRef idx="0">
+            <a:schemeClr val="accent1"/>
+          </a:fillRef>
+          <a:effectRef idx="0">
+            <a:schemeClr val="accent1"/>
+          </a:effectRef>
+          <a:fontRef idx="minor">
+            <a:schemeClr val="tx1"/>
+          </a:fontRef>
+        </p:style>
+      </p:cxnSp>
+      <p:cxnSp>
+        <p:nvCxnSpPr>
+          <p:cNvPr id="12" name="Straight Connector 11">
+            <a:extLst>
+              <a:ext uri="{FF2B5EF4-FFF2-40B4-BE49-F238E27FC236}">
+                <a16:creationId xmlns:a16="http://schemas.microsoft.com/office/drawing/2014/main" id="{829C8657-4EB6-EE43-A449-31DEC467691A}"/>
+              </a:ext>
+            </a:extLst>
+          </p:cNvPr>
+          <p:cNvCxnSpPr>
+            <a:cxnSpLocks/>
+          </p:cNvCxnSpPr>
+          <p:nvPr/>
+        </p:nvCxnSpPr>
+        <p:spPr>
+          <a:xfrm>
+            <a:off x="1712259" y="1640541"/>
+            <a:ext cx="8901953" cy="0"/>
+          </a:xfrm>
+          <a:prstGeom prst="line">
+            <a:avLst/>
+          </a:prstGeom>
+        </p:spPr>
+        <p:style>
+          <a:lnRef idx="1">
+            <a:schemeClr val="accent1"/>
+          </a:lnRef>
+          <a:fillRef idx="0">
+            <a:schemeClr val="accent1"/>
+          </a:fillRef>
+          <a:effectRef idx="0">
+            <a:schemeClr val="accent1"/>
+          </a:effectRef>
+          <a:fontRef idx="minor">
+            <a:schemeClr val="tx1"/>
+          </a:fontRef>
+        </p:style>
+      </p:cxnSp>
+      <p:cxnSp>
+        <p:nvCxnSpPr>
+          <p:cNvPr id="16" name="Straight Connector 15">
+            <a:extLst>
+              <a:ext uri="{FF2B5EF4-FFF2-40B4-BE49-F238E27FC236}">
+                <a16:creationId xmlns:a16="http://schemas.microsoft.com/office/drawing/2014/main" id="{C1595F9F-BA21-6E49-809F-1F443E415C3C}"/>
+              </a:ext>
+            </a:extLst>
+          </p:cNvPr>
+          <p:cNvCxnSpPr/>
+          <p:nvPr/>
+        </p:nvCxnSpPr>
+        <p:spPr>
+          <a:xfrm flipV="1">
+            <a:off x="1712259" y="5396753"/>
+            <a:ext cx="8722659" cy="80682"/>
+          </a:xfrm>
+          <a:prstGeom prst="line">
+            <a:avLst/>
+          </a:prstGeom>
+        </p:spPr>
+        <p:style>
+          <a:lnRef idx="1">
+            <a:schemeClr val="accent1"/>
+          </a:lnRef>
+          <a:fillRef idx="0">
+            <a:schemeClr val="accent1"/>
+          </a:fillRef>
+          <a:effectRef idx="0">
+            <a:schemeClr val="accent1"/>
+          </a:effectRef>
+          <a:fontRef idx="minor">
+            <a:schemeClr val="tx1"/>
+          </a:fontRef>
+        </p:style>
+      </p:cxnSp>
+      <p:sp>
+        <p:nvSpPr>
+          <p:cNvPr id="17" name="TextBox 16">
+            <a:extLst>
+              <a:ext uri="{FF2B5EF4-FFF2-40B4-BE49-F238E27FC236}">
+                <a16:creationId xmlns:a16="http://schemas.microsoft.com/office/drawing/2014/main" id="{8FD68513-BFAB-BC45-8B6C-47B87EF90095}"/>
+              </a:ext>
+            </a:extLst>
+          </p:cNvPr>
+          <p:cNvSpPr txBox="1"/>
+          <p:nvPr/>
+        </p:nvSpPr>
+        <p:spPr>
+          <a:xfrm>
+            <a:off x="10282070" y="6158473"/>
+            <a:ext cx="332142" cy="369332"/>
+          </a:xfrm>
+          <a:prstGeom prst="rect">
+            <a:avLst/>
+          </a:prstGeom>
+          <a:noFill/>
+        </p:spPr>
+        <p:txBody>
+          <a:bodyPr wrap="none" rtlCol="0">
+            <a:spAutoFit/>
+          </a:bodyPr>
+          <a:lstStyle/>
+          <a:p>
+            <a:r>
+              <a:rPr lang="en-CN" dirty="0"/>
+              <a:t>A</a:t>
+            </a:r>
+          </a:p>
+        </p:txBody>
+      </p:sp>
+      <p:sp>
+        <p:nvSpPr>
+          <p:cNvPr id="18" name="TextBox 17">
+            <a:extLst>
+              <a:ext uri="{FF2B5EF4-FFF2-40B4-BE49-F238E27FC236}">
+                <a16:creationId xmlns:a16="http://schemas.microsoft.com/office/drawing/2014/main" id="{59EE12ED-11A9-894F-8134-34FDB968AE7C}"/>
+              </a:ext>
+            </a:extLst>
+          </p:cNvPr>
+          <p:cNvSpPr txBox="1"/>
+          <p:nvPr/>
+        </p:nvSpPr>
+        <p:spPr>
+          <a:xfrm>
+            <a:off x="10368112" y="5226260"/>
+            <a:ext cx="312906" cy="369332"/>
+          </a:xfrm>
+          <a:prstGeom prst="rect">
+            <a:avLst/>
+          </a:prstGeom>
+          <a:noFill/>
+        </p:spPr>
+        <p:txBody>
+          <a:bodyPr wrap="none" rtlCol="0">
+            <a:spAutoFit/>
+          </a:bodyPr>
+          <a:lstStyle/>
+          <a:p>
+            <a:r>
+              <a:rPr lang="en-CN" dirty="0"/>
+              <a:t>B</a:t>
+            </a:r>
+          </a:p>
+        </p:txBody>
+      </p:sp>
+      <p:sp>
+        <p:nvSpPr>
+          <p:cNvPr id="19" name="TextBox 18">
+            <a:extLst>
+              <a:ext uri="{FF2B5EF4-FFF2-40B4-BE49-F238E27FC236}">
+                <a16:creationId xmlns:a16="http://schemas.microsoft.com/office/drawing/2014/main" id="{246C0CF2-00C3-B648-9AA1-FE57E9723218}"/>
+              </a:ext>
+            </a:extLst>
+          </p:cNvPr>
+          <p:cNvSpPr txBox="1"/>
+          <p:nvPr/>
+        </p:nvSpPr>
+        <p:spPr>
+          <a:xfrm>
+            <a:off x="10554965" y="1505252"/>
+            <a:ext cx="327334" cy="369332"/>
+          </a:xfrm>
+          <a:prstGeom prst="rect">
+            <a:avLst/>
+          </a:prstGeom>
+          <a:noFill/>
+        </p:spPr>
+        <p:txBody>
+          <a:bodyPr wrap="none" rtlCol="0">
+            <a:spAutoFit/>
+          </a:bodyPr>
+          <a:lstStyle/>
+          <a:p>
+            <a:r>
+              <a:rPr lang="en-CN" dirty="0"/>
+              <a:t>C</a:t>
+            </a:r>
+          </a:p>
+        </p:txBody>
+      </p:sp>
+      <p:sp>
+        <p:nvSpPr>
+          <p:cNvPr id="20" name="TextBox 19">
+            <a:extLst>
+              <a:ext uri="{FF2B5EF4-FFF2-40B4-BE49-F238E27FC236}">
+                <a16:creationId xmlns:a16="http://schemas.microsoft.com/office/drawing/2014/main" id="{239A6050-BCB0-5941-8B79-A44C6BF4A1D3}"/>
+              </a:ext>
+            </a:extLst>
+          </p:cNvPr>
+          <p:cNvSpPr txBox="1"/>
+          <p:nvPr/>
+        </p:nvSpPr>
+        <p:spPr>
+          <a:xfrm>
+            <a:off x="10425099" y="530479"/>
+            <a:ext cx="343364" cy="369332"/>
+          </a:xfrm>
+          <a:prstGeom prst="rect">
+            <a:avLst/>
+          </a:prstGeom>
+          <a:noFill/>
+        </p:spPr>
+        <p:txBody>
+          <a:bodyPr wrap="none" rtlCol="0">
+            <a:spAutoFit/>
+          </a:bodyPr>
+          <a:lstStyle/>
+          <a:p>
+            <a:r>
+              <a:rPr lang="en-CN" dirty="0"/>
+              <a:t>D</a:t>
+            </a:r>
+          </a:p>
+        </p:txBody>
+      </p:sp>
+      <p:sp>
+        <p:nvSpPr>
+          <p:cNvPr id="21" name="TextBox 20">
+            <a:extLst>
+              <a:ext uri="{FF2B5EF4-FFF2-40B4-BE49-F238E27FC236}">
+                <a16:creationId xmlns:a16="http://schemas.microsoft.com/office/drawing/2014/main" id="{D3ACB4ED-1459-EC46-9AEB-7ADBFBA164B2}"/>
+              </a:ext>
+            </a:extLst>
+          </p:cNvPr>
+          <p:cNvSpPr txBox="1"/>
+          <p:nvPr/>
+        </p:nvSpPr>
+        <p:spPr>
+          <a:xfrm>
+            <a:off x="1548971" y="5966467"/>
+            <a:ext cx="300082" cy="369332"/>
+          </a:xfrm>
+          <a:prstGeom prst="rect">
+            <a:avLst/>
+          </a:prstGeom>
+          <a:noFill/>
+        </p:spPr>
+        <p:txBody>
+          <a:bodyPr wrap="none" rtlCol="0">
+            <a:spAutoFit/>
+          </a:bodyPr>
+          <a:lstStyle/>
+          <a:p>
+            <a:r>
+              <a:rPr lang="en-CN" dirty="0"/>
+              <a:t>E</a:t>
+            </a:r>
+          </a:p>
+        </p:txBody>
+      </p:sp>
+      <p:sp>
+        <p:nvSpPr>
+          <p:cNvPr id="22" name="TextBox 21">
+            <a:extLst>
+              <a:ext uri="{FF2B5EF4-FFF2-40B4-BE49-F238E27FC236}">
+                <a16:creationId xmlns:a16="http://schemas.microsoft.com/office/drawing/2014/main" id="{15448A98-B54A-3741-9866-0E98A759E401}"/>
+              </a:ext>
+            </a:extLst>
+          </p:cNvPr>
+          <p:cNvSpPr txBox="1"/>
+          <p:nvPr/>
+        </p:nvSpPr>
+        <p:spPr>
+          <a:xfrm>
+            <a:off x="1672485" y="5290629"/>
+            <a:ext cx="295274" cy="369332"/>
+          </a:xfrm>
+          <a:prstGeom prst="rect">
+            <a:avLst/>
+          </a:prstGeom>
+          <a:noFill/>
+        </p:spPr>
+        <p:txBody>
+          <a:bodyPr wrap="none" rtlCol="0">
+            <a:spAutoFit/>
+          </a:bodyPr>
+          <a:lstStyle/>
+          <a:p>
+            <a:r>
+              <a:rPr lang="en-CN" dirty="0"/>
+              <a:t>F</a:t>
+            </a:r>
+          </a:p>
+        </p:txBody>
+      </p:sp>
+      <p:sp>
+        <p:nvSpPr>
+          <p:cNvPr id="23" name="TextBox 22">
+            <a:extLst>
+              <a:ext uri="{FF2B5EF4-FFF2-40B4-BE49-F238E27FC236}">
+                <a16:creationId xmlns:a16="http://schemas.microsoft.com/office/drawing/2014/main" id="{40AF1934-11B3-D940-8515-4D77CD35F96B}"/>
+              </a:ext>
+            </a:extLst>
+          </p:cNvPr>
+          <p:cNvSpPr txBox="1"/>
+          <p:nvPr/>
+        </p:nvSpPr>
+        <p:spPr>
+          <a:xfrm>
+            <a:off x="1712258" y="1466525"/>
+            <a:ext cx="340158" cy="369332"/>
+          </a:xfrm>
+          <a:prstGeom prst="rect">
+            <a:avLst/>
+          </a:prstGeom>
+          <a:noFill/>
+        </p:spPr>
+        <p:txBody>
+          <a:bodyPr wrap="none" rtlCol="0">
+            <a:spAutoFit/>
+          </a:bodyPr>
+          <a:lstStyle/>
+          <a:p>
+            <a:r>
+              <a:rPr lang="en-CN" dirty="0"/>
+              <a:t>G</a:t>
+            </a:r>
+          </a:p>
+        </p:txBody>
+      </p:sp>
+      <p:sp>
+        <p:nvSpPr>
+          <p:cNvPr id="24" name="TextBox 23">
+            <a:extLst>
+              <a:ext uri="{FF2B5EF4-FFF2-40B4-BE49-F238E27FC236}">
+                <a16:creationId xmlns:a16="http://schemas.microsoft.com/office/drawing/2014/main" id="{D34AB3B2-7E1A-0F47-A87D-A6F40EC0A5B3}"/>
+              </a:ext>
+            </a:extLst>
+          </p:cNvPr>
+          <p:cNvSpPr txBox="1"/>
+          <p:nvPr/>
+        </p:nvSpPr>
+        <p:spPr>
+          <a:xfrm>
+            <a:off x="1707450" y="553117"/>
+            <a:ext cx="344966" cy="369332"/>
+          </a:xfrm>
+          <a:prstGeom prst="rect">
+            <a:avLst/>
+          </a:prstGeom>
+          <a:noFill/>
+        </p:spPr>
+        <p:txBody>
+          <a:bodyPr wrap="none" rtlCol="0">
+            <a:spAutoFit/>
+          </a:bodyPr>
+          <a:lstStyle/>
+          <a:p>
+            <a:r>
+              <a:rPr lang="en-CN" dirty="0"/>
+              <a:t>H</a:t>
+            </a:r>
+          </a:p>
+        </p:txBody>
+      </p:sp>
+    </p:spTree>
+    <p:extLst>
+      <p:ext uri="{BB962C8B-B14F-4D97-AF65-F5344CB8AC3E}">
+        <p14:creationId xmlns:p14="http://schemas.microsoft.com/office/powerpoint/2010/main" val="1913823811"/>
+      </p:ext>
+    </p:extLst>
+  </p:cSld>
+  <p:clrMapOvr>
+    <a:masterClrMapping/>
+  </p:clrMapOvr>
+</p:sld>
+</file>
+
 <file path=ppt/theme/theme1.xml><?xml version="1.0" encoding="utf-8"?>
 <a:theme xmlns:a="http://schemas.openxmlformats.org/drawingml/2006/main" name="Office Theme">
   <a:themeElements>

</xml_diff>